<commit_message>
modified tutorial-06; hid subsection title slide
</commit_message>
<xml_diff>
--- a/tutorial-06-migratability.pptx
+++ b/tutorial-06-migratability.pptx
@@ -7042,7 +7042,7 @@
 </file>
 
 <file path=ppt/slides/slide2.xml><?xml version="1.0" encoding="utf-8"?>
-<p:sld xmlns:a="http://schemas.openxmlformats.org/drawingml/2006/main" xmlns:r="http://schemas.openxmlformats.org/officeDocument/2006/relationships" xmlns:p="http://schemas.openxmlformats.org/presentationml/2006/main">
+<p:sld xmlns:a="http://schemas.openxmlformats.org/drawingml/2006/main" xmlns:r="http://schemas.openxmlformats.org/officeDocument/2006/relationships" xmlns:p="http://schemas.openxmlformats.org/presentationml/2006/main" show="0">
   <p:cSld>
     <p:spTree>
       <p:nvGrpSpPr>
@@ -7153,17 +7153,18 @@
           <a:p>
             <a:pPr algn="ctr"/>
             <a:r>
-              <a:rPr lang="en-US" sz="3600" dirty="0"/>
+              <a:rPr lang="en-US" sz="3600" dirty="0" smtClean="0"/>
               <a:t>Object Serialization Using PUP: The Pack/</a:t>
             </a:r>
             <a:r>
-              <a:rPr lang="en-US" sz="3600" dirty="0" err="1"/>
+              <a:rPr lang="en-US" sz="3600" dirty="0" err="1" smtClean="0"/>
               <a:t>UnPack</a:t>
             </a:r>
             <a:r>
-              <a:rPr lang="en-US" sz="3600" dirty="0"/>
+              <a:rPr lang="en-US" sz="3600" dirty="0" smtClean="0"/>
               <a:t> Framework</a:t>
             </a:r>
+            <a:endParaRPr lang="en-US" sz="3600" dirty="0"/>
           </a:p>
         </p:txBody>
       </p:sp>
@@ -7177,6 +7178,14 @@
   <p:clrMapOvr>
     <a:masterClrMapping/>
   </p:clrMapOvr>
+  <mc:AlternateContent xmlns:mc="http://schemas.openxmlformats.org/markup-compatibility/2006">
+    <mc:Choice xmlns:p14="http://schemas.microsoft.com/office/powerpoint/2010/main" Requires="p14">
+      <p:transition spd="slow" p14:dur="2000"/>
+    </mc:Choice>
+    <mc:Fallback>
+      <p:transition xmlns:p14="http://schemas.microsoft.com/office/powerpoint/2010/main" spd="slow"/>
+    </mc:Fallback>
+  </mc:AlternateContent>
   <p:timing>
     <p:tnLst>
       <p:par>

</xml_diff>

<commit_message>
Fix alignment issues, text sizes, and add missing underlines; rehide slide due to over-write
</commit_message>
<xml_diff>
--- a/tutorial-06-migratability.pptx
+++ b/tutorial-06-migratability.pptx
@@ -7153,18 +7153,17 @@
           <a:p>
             <a:pPr algn="ctr"/>
             <a:r>
-              <a:rPr lang="en-US" sz="3600" dirty="0" smtClean="0"/>
+              <a:rPr lang="en-US" sz="3600" dirty="0"/>
               <a:t>Object Serialization Using PUP: The Pack/</a:t>
             </a:r>
             <a:r>
-              <a:rPr lang="en-US" sz="3600" dirty="0" err="1" smtClean="0"/>
+              <a:rPr lang="en-US" sz="3600" dirty="0" err="1"/>
               <a:t>UnPack</a:t>
             </a:r>
             <a:r>
-              <a:rPr lang="en-US" sz="3600" dirty="0" smtClean="0"/>
+              <a:rPr lang="en-US" sz="3600" dirty="0"/>
               <a:t> Framework</a:t>
             </a:r>
-            <a:endParaRPr lang="en-US" sz="3600" dirty="0"/>
           </a:p>
         </p:txBody>
       </p:sp>
@@ -7416,7 +7415,7 @@
           </a:xfrm>
         </p:spPr>
         <p:txBody>
-          <a:bodyPr/>
+          <a:bodyPr anchor="t" anchorCtr="0"/>
           <a:lstStyle/>
           <a:p>
             <a:r>
@@ -7427,17 +7426,17 @@
           <a:p>
             <a:pPr lvl="1"/>
             <a:r>
-              <a:rPr lang="en-US" dirty="0" err="1" smtClean="0"/>
+              <a:rPr lang="en-US" dirty="0" smtClean="0"/>
               <a:t>ckAboutToMigrate</a:t>
             </a:r>
+          </a:p>
+          <a:p>
+            <a:pPr lvl="1"/>
             <a:r>
               <a:rPr lang="en-US" dirty="0" smtClean="0"/>
-              <a:t> </a:t>
-            </a:r>
-            <a:r>
-              <a:rPr lang="en-US" dirty="0"/>
-              <a:t>I Sizing</a:t>
-            </a:r>
+              <a:t>Sizing</a:t>
+            </a:r>
+            <a:endParaRPr lang="en-US" dirty="0"/>
           </a:p>
           <a:p>
             <a:pPr lvl="1"/>
@@ -7474,7 +7473,7 @@
           </a:xfrm>
         </p:spPr>
         <p:txBody>
-          <a:bodyPr/>
+          <a:bodyPr anchor="t" anchorCtr="0"/>
           <a:lstStyle/>
           <a:p>
             <a:r>
@@ -7497,7 +7496,7 @@
           <a:p>
             <a:pPr lvl="1"/>
             <a:r>
-              <a:rPr lang="en-US" dirty="0" err="1" smtClean="0"/>
+              <a:rPr lang="en-US" dirty="0" smtClean="0"/>
               <a:t>UnPacking</a:t>
             </a:r>
             <a:endParaRPr lang="en-US" dirty="0"/>
@@ -7887,32 +7886,46 @@
               <a:t>    </a:t>
             </a:r>
             <a:r>
-              <a:rPr lang="en-US" sz="1600" b="1" dirty="0" smtClean="0">
+              <a:rPr lang="en-US" sz="2100" b="1" dirty="0" smtClean="0">
                 <a:latin typeface="Consolas"/>
                 <a:cs typeface="Consolas"/>
               </a:rPr>
               <a:t>float</a:t>
             </a:r>
             <a:r>
-              <a:rPr lang="en-US" sz="1600" dirty="0" smtClean="0">
+              <a:rPr lang="en-US" sz="1700" dirty="0" smtClean="0">
                 <a:latin typeface="Consolas"/>
                 <a:cs typeface="Consolas"/>
               </a:rPr>
               <a:t> </a:t>
             </a:r>
             <a:r>
-              <a:rPr lang="en-US" sz="1600" dirty="0" err="1">
+              <a:rPr lang="en-US" sz="1700" dirty="0" err="1">
                 <a:latin typeface="Consolas"/>
                 <a:cs typeface="Consolas"/>
               </a:rPr>
               <a:t>localArray</a:t>
             </a:r>
             <a:r>
-              <a:rPr lang="en-US" sz="1600" dirty="0">
-                <a:latin typeface="Consolas"/>
-                <a:cs typeface="Consolas"/>
-              </a:rPr>
-              <a:t>[LOCAL SIZE];</a:t>
+              <a:rPr lang="en-US" sz="1700" dirty="0">
+                <a:latin typeface="Consolas"/>
+                <a:cs typeface="Consolas"/>
+              </a:rPr>
+              <a:t>[</a:t>
+            </a:r>
+            <a:r>
+              <a:rPr lang="en-US" sz="1700" dirty="0" smtClean="0">
+                <a:latin typeface="Consolas"/>
+                <a:cs typeface="Consolas"/>
+              </a:rPr>
+              <a:t>LOCAL_SIZE</a:t>
+            </a:r>
+            <a:r>
+              <a:rPr lang="en-US" sz="1700" dirty="0">
+                <a:latin typeface="Consolas"/>
+                <a:cs typeface="Consolas"/>
+              </a:rPr>
+              <a:t>];</a:t>
             </a:r>
           </a:p>
           <a:p>
@@ -8111,32 +8124,46 @@
               <a:t>   </a:t>
             </a:r>
             <a:r>
-              <a:rPr lang="en-US" sz="1800" dirty="0" smtClean="0">
+              <a:rPr lang="en-US" sz="2100" dirty="0" smtClean="0">
                 <a:latin typeface="Consolas"/>
                 <a:cs typeface="Consolas"/>
               </a:rPr>
               <a:t>p</a:t>
             </a:r>
             <a:r>
-              <a:rPr lang="en-US" sz="1800" dirty="0">
+              <a:rPr lang="en-US" sz="2100" dirty="0">
                 <a:latin typeface="Consolas"/>
                 <a:cs typeface="Consolas"/>
               </a:rPr>
               <a:t>(</a:t>
             </a:r>
             <a:r>
-              <a:rPr lang="en-US" sz="1800" dirty="0" err="1">
+              <a:rPr lang="en-US" sz="2100" dirty="0" err="1">
                 <a:latin typeface="Consolas"/>
                 <a:cs typeface="Consolas"/>
               </a:rPr>
               <a:t>localArray</a:t>
             </a:r>
             <a:r>
-              <a:rPr lang="en-US" sz="1800" dirty="0">
-                <a:latin typeface="Consolas"/>
-                <a:cs typeface="Consolas"/>
-              </a:rPr>
-              <a:t>, LOCAL SIZE);</a:t>
+              <a:rPr lang="en-US" sz="2100" dirty="0">
+                <a:latin typeface="Consolas"/>
+                <a:cs typeface="Consolas"/>
+              </a:rPr>
+              <a:t>, </a:t>
+            </a:r>
+            <a:r>
+              <a:rPr lang="en-US" sz="2100" dirty="0" smtClean="0">
+                <a:latin typeface="Consolas"/>
+                <a:cs typeface="Consolas"/>
+              </a:rPr>
+              <a:t>LOCAL_SIZE</a:t>
+            </a:r>
+            <a:r>
+              <a:rPr lang="en-US" sz="2100" dirty="0">
+                <a:latin typeface="Consolas"/>
+                <a:cs typeface="Consolas"/>
+              </a:rPr>
+              <a:t>);</a:t>
             </a:r>
           </a:p>
           <a:p>
@@ -8374,7 +8401,7 @@
                 <a:latin typeface="Consolas"/>
                 <a:cs typeface="Consolas"/>
               </a:rPr>
-              <a:t>CBase</a:t>
+              <a:t>CBase_MyChare</a:t>
             </a:r>
             <a:r>
               <a:rPr lang="en-US" dirty="0" smtClean="0">
@@ -8384,18 +8411,11 @@
               <a:t> </a:t>
             </a:r>
             <a:r>
-              <a:rPr lang="en-US" dirty="0" err="1">
-                <a:latin typeface="Consolas"/>
-                <a:cs typeface="Consolas"/>
-              </a:rPr>
-              <a:t>MyChare</a:t>
-            </a:r>
-            <a:r>
               <a:rPr lang="en-US" dirty="0">
                 <a:latin typeface="Consolas"/>
                 <a:cs typeface="Consolas"/>
               </a:rPr>
-              <a:t> {</a:t>
+              <a:t>{</a:t>
             </a:r>
           </a:p>
           <a:p>
@@ -8632,28 +8652,14 @@
                 <a:latin typeface="Consolas"/>
                 <a:cs typeface="Consolas"/>
               </a:rPr>
-              <a:t>  </a:t>
+              <a:t> </a:t>
             </a:r>
             <a:r>
               <a:rPr lang="en-US" dirty="0" err="1" smtClean="0">
                 <a:latin typeface="Consolas"/>
                 <a:cs typeface="Consolas"/>
               </a:rPr>
-              <a:t>CBase</a:t>
-            </a:r>
-            <a:r>
-              <a:rPr lang="en-US" dirty="0" smtClean="0">
-                <a:latin typeface="Consolas"/>
-                <a:cs typeface="Consolas"/>
-              </a:rPr>
-              <a:t> </a:t>
-            </a:r>
-            <a:r>
-              <a:rPr lang="en-US" dirty="0" err="1">
-                <a:latin typeface="Consolas"/>
-                <a:cs typeface="Consolas"/>
-              </a:rPr>
-              <a:t>MyChare</a:t>
+              <a:t>CBase_MyChare</a:t>
             </a:r>
             <a:r>
               <a:rPr lang="en-US" dirty="0">
@@ -8683,7 +8689,7 @@
                 <a:latin typeface="Consolas"/>
                 <a:cs typeface="Consolas"/>
               </a:rPr>
-              <a:t>  p </a:t>
+              <a:t> p </a:t>
             </a:r>
             <a:r>
               <a:rPr lang="en-US" dirty="0">
@@ -8716,7 +8722,7 @@
                 <a:latin typeface="Consolas"/>
                 <a:cs typeface="Consolas"/>
               </a:rPr>
-              <a:t>   </a:t>
+              <a:t>  </a:t>
             </a:r>
             <a:r>
               <a:rPr lang="en-US" b="1" dirty="0" smtClean="0">
@@ -8763,7 +8769,7 @@
                 <a:latin typeface="Consolas"/>
                 <a:cs typeface="Consolas"/>
               </a:rPr>
-              <a:t>      </a:t>
+              <a:t>    </a:t>
             </a:r>
             <a:r>
               <a:rPr lang="en-US" dirty="0" err="1" smtClean="0">
@@ -8787,32 +8793,121 @@
               <a:t>= </a:t>
             </a:r>
             <a:r>
-              <a:rPr lang="en-US" b="1" dirty="0">
+              <a:rPr lang="en-US" b="1" dirty="0" smtClean="0">
                 <a:latin typeface="Consolas"/>
                 <a:cs typeface="Consolas"/>
               </a:rPr>
               <a:t>new</a:t>
             </a:r>
             <a:r>
+              <a:rPr lang="en-US" dirty="0" smtClean="0">
+                <a:latin typeface="Consolas"/>
+                <a:cs typeface="Consolas"/>
+              </a:rPr>
+              <a:t> </a:t>
+            </a:r>
+            <a:r>
+              <a:rPr lang="en-US" b="1" dirty="0" smtClean="0">
+                <a:latin typeface="Consolas"/>
+                <a:cs typeface="Consolas"/>
+              </a:rPr>
+              <a:t>float</a:t>
+            </a:r>
+            <a:r>
+              <a:rPr lang="en-US" dirty="0" smtClean="0">
+                <a:latin typeface="Consolas"/>
+                <a:cs typeface="Consolas"/>
+              </a:rPr>
+              <a:t>[ </a:t>
+            </a:r>
+          </a:p>
+          <a:p>
+            <a:pPr marL="0" indent="0">
+              <a:buNone/>
+            </a:pPr>
+            <a:r>
+              <a:rPr lang="en-US" dirty="0" smtClean="0">
+                <a:latin typeface="Consolas"/>
+                <a:cs typeface="Consolas"/>
+              </a:rPr>
+              <a:t>        </a:t>
+            </a:r>
+            <a:r>
+              <a:rPr lang="en-US" dirty="0" err="1" smtClean="0">
+                <a:latin typeface="Consolas"/>
+                <a:cs typeface="Consolas"/>
+              </a:rPr>
+              <a:t>heapArraySize</a:t>
+            </a:r>
+            <a:r>
+              <a:rPr lang="en-US" dirty="0" smtClean="0">
+                <a:latin typeface="Consolas"/>
+                <a:cs typeface="Consolas"/>
+              </a:rPr>
+              <a:t>];</a:t>
+            </a:r>
+          </a:p>
+          <a:p>
+            <a:pPr marL="0" indent="0">
+              <a:buNone/>
+            </a:pPr>
+            <a:r>
+              <a:rPr lang="en-US" dirty="0" smtClean="0">
+                <a:latin typeface="Consolas"/>
+                <a:cs typeface="Consolas"/>
+              </a:rPr>
+              <a:t>  }</a:t>
+            </a:r>
+            <a:endParaRPr lang="en-US" dirty="0">
+              <a:latin typeface="Consolas"/>
+              <a:cs typeface="Consolas"/>
+            </a:endParaRPr>
+          </a:p>
+          <a:p>
+            <a:pPr marL="0" indent="0">
+              <a:buNone/>
+            </a:pPr>
+            <a:r>
+              <a:rPr lang="en-US" dirty="0" smtClean="0">
+                <a:latin typeface="Consolas"/>
+                <a:cs typeface="Consolas"/>
+              </a:rPr>
+              <a:t>  p</a:t>
+            </a:r>
+            <a:r>
               <a:rPr lang="en-US" dirty="0">
                 <a:latin typeface="Consolas"/>
                 <a:cs typeface="Consolas"/>
               </a:rPr>
-              <a:t> </a:t>
-            </a:r>
-            <a:r>
-              <a:rPr lang="en-US" b="1" dirty="0">
-                <a:latin typeface="Consolas"/>
-                <a:cs typeface="Consolas"/>
-              </a:rPr>
-              <a:t>float</a:t>
+              <a:t>(</a:t>
+            </a:r>
+            <a:r>
+              <a:rPr lang="en-US" dirty="0" err="1">
+                <a:latin typeface="Consolas"/>
+                <a:cs typeface="Consolas"/>
+              </a:rPr>
+              <a:t>heapArray</a:t>
             </a:r>
             <a:r>
               <a:rPr lang="en-US" dirty="0">
                 <a:latin typeface="Consolas"/>
                 <a:cs typeface="Consolas"/>
               </a:rPr>
-              <a:t>[ </a:t>
+              <a:t>, </a:t>
+            </a:r>
+            <a:r>
+              <a:rPr lang="en-US" dirty="0" err="1">
+                <a:latin typeface="Consolas"/>
+                <a:cs typeface="Consolas"/>
+              </a:rPr>
+              <a:t>heapArraySize</a:t>
+            </a:r>
+            <a:r>
+              <a:rPr lang="en-US" dirty="0">
+                <a:latin typeface="Consolas"/>
+                <a:cs typeface="Consolas"/>
+              </a:rPr>
+              <a:t>); </a:t>
             </a:r>
             <a:endParaRPr lang="en-US" dirty="0" smtClean="0">
               <a:latin typeface="Consolas"/>
@@ -8824,32 +8919,227 @@
               <a:buNone/>
             </a:pPr>
             <a:r>
+              <a:rPr lang="en-US" dirty="0" smtClean="0">
+                <a:latin typeface="Consolas"/>
+                <a:cs typeface="Consolas"/>
+              </a:rPr>
+              <a:t>  </a:t>
+            </a:r>
+            <a:r>
+              <a:rPr lang="en-US" b="1" dirty="0" err="1" smtClean="0">
+                <a:latin typeface="Consolas"/>
+                <a:cs typeface="Consolas"/>
+              </a:rPr>
+              <a:t>bool</a:t>
+            </a:r>
+            <a:r>
+              <a:rPr lang="en-US" dirty="0" smtClean="0">
+                <a:latin typeface="Consolas"/>
+                <a:cs typeface="Consolas"/>
+              </a:rPr>
+              <a:t> </a:t>
+            </a:r>
+            <a:r>
+              <a:rPr lang="en-US" dirty="0" err="1">
+                <a:latin typeface="Consolas"/>
+                <a:cs typeface="Consolas"/>
+              </a:rPr>
+              <a:t>isNull</a:t>
+            </a:r>
+            <a:r>
               <a:rPr lang="en-US" dirty="0">
                 <a:latin typeface="Consolas"/>
                 <a:cs typeface="Consolas"/>
               </a:rPr>
+              <a:t> = !pointer;</a:t>
+            </a:r>
+          </a:p>
+          <a:p>
+            <a:pPr marL="0" indent="0">
+              <a:buNone/>
+            </a:pPr>
+            <a:r>
+              <a:rPr lang="en-US" dirty="0" smtClean="0">
+                <a:latin typeface="Consolas"/>
+                <a:cs typeface="Consolas"/>
+              </a:rPr>
+              <a:t>  p </a:t>
+            </a:r>
+            <a:r>
+              <a:rPr lang="en-US" dirty="0">
+                <a:latin typeface="Consolas"/>
+                <a:cs typeface="Consolas"/>
+              </a:rPr>
+              <a:t>| </a:t>
+            </a:r>
+            <a:r>
+              <a:rPr lang="en-US" dirty="0" err="1">
+                <a:latin typeface="Consolas"/>
+                <a:cs typeface="Consolas"/>
+              </a:rPr>
+              <a:t>isNull</a:t>
+            </a:r>
+            <a:r>
+              <a:rPr lang="en-US" dirty="0">
+                <a:latin typeface="Consolas"/>
+                <a:cs typeface="Consolas"/>
+              </a:rPr>
+              <a:t>;</a:t>
+            </a:r>
+          </a:p>
+          <a:p>
+            <a:pPr marL="0" indent="0">
+              <a:buNone/>
+            </a:pPr>
+            <a:r>
+              <a:rPr lang="en-US" dirty="0" smtClean="0">
+                <a:latin typeface="Consolas"/>
+                <a:cs typeface="Consolas"/>
+              </a:rPr>
+              <a:t>  </a:t>
+            </a:r>
+            <a:r>
+              <a:rPr lang="en-US" b="1" dirty="0" smtClean="0">
+                <a:latin typeface="Consolas"/>
+                <a:cs typeface="Consolas"/>
+              </a:rPr>
+              <a:t>if</a:t>
+            </a:r>
+            <a:r>
+              <a:rPr lang="en-US" dirty="0" smtClean="0">
+                <a:latin typeface="Consolas"/>
+                <a:cs typeface="Consolas"/>
+              </a:rPr>
               <a:t> </a:t>
             </a:r>
             <a:r>
+              <a:rPr lang="en-US" dirty="0">
+                <a:latin typeface="Consolas"/>
+                <a:cs typeface="Consolas"/>
+              </a:rPr>
+              <a:t>(!</a:t>
+            </a:r>
+            <a:r>
+              <a:rPr lang="en-US" dirty="0" err="1">
+                <a:latin typeface="Consolas"/>
+                <a:cs typeface="Consolas"/>
+              </a:rPr>
+              <a:t>isNull</a:t>
+            </a:r>
+            <a:r>
+              <a:rPr lang="en-US" dirty="0">
+                <a:latin typeface="Consolas"/>
+                <a:cs typeface="Consolas"/>
+              </a:rPr>
+              <a:t>) </a:t>
+            </a:r>
+            <a:r>
               <a:rPr lang="en-US" dirty="0" smtClean="0">
                 <a:latin typeface="Consolas"/>
                 <a:cs typeface="Consolas"/>
               </a:rPr>
-              <a:t>           </a:t>
-            </a:r>
-            <a:r>
-              <a:rPr lang="en-US" dirty="0" err="1" smtClean="0">
-                <a:latin typeface="Consolas"/>
-                <a:cs typeface="Consolas"/>
-              </a:rPr>
-              <a:t>heapArraySize</a:t>
+              <a:t>{</a:t>
+            </a:r>
+          </a:p>
+          <a:p>
+            <a:pPr marL="0" indent="0">
+              <a:buNone/>
+            </a:pPr>
+            <a:r>
+              <a:rPr lang="en-US" dirty="0" smtClean="0">
+                <a:latin typeface="Consolas"/>
+                <a:cs typeface="Consolas"/>
+              </a:rPr>
+              <a:t>    </a:t>
+            </a:r>
+            <a:r>
+              <a:rPr lang="en-US" sz="2600" b="1" dirty="0" smtClean="0">
+                <a:latin typeface="Consolas"/>
+                <a:cs typeface="Consolas"/>
+              </a:rPr>
+              <a:t>if</a:t>
+            </a:r>
+            <a:r>
+              <a:rPr lang="en-US" sz="2600" dirty="0" smtClean="0">
+                <a:latin typeface="Consolas"/>
+                <a:cs typeface="Consolas"/>
+              </a:rPr>
+              <a:t>(</a:t>
+            </a:r>
+            <a:r>
+              <a:rPr lang="en-US" sz="2600" dirty="0" err="1" smtClean="0">
+                <a:latin typeface="Consolas"/>
+                <a:cs typeface="Consolas"/>
+              </a:rPr>
+              <a:t>p.isUnpacking</a:t>
+            </a:r>
+            <a:r>
+              <a:rPr lang="en-US" sz="2600" dirty="0" smtClean="0">
+                <a:latin typeface="Consolas"/>
+                <a:cs typeface="Consolas"/>
+              </a:rPr>
+              <a:t>()) pointer =</a:t>
+            </a:r>
+          </a:p>
+          <a:p>
+            <a:pPr marL="0" indent="0">
+              <a:buNone/>
+            </a:pPr>
+            <a:r>
+              <a:rPr lang="en-US" dirty="0" smtClean="0">
+                <a:latin typeface="Consolas"/>
+                <a:cs typeface="Consolas"/>
+              </a:rPr>
+              <a:t>    </a:t>
             </a:r>
             <a:r>
               <a:rPr lang="en-US" dirty="0">
                 <a:latin typeface="Consolas"/>
                 <a:cs typeface="Consolas"/>
               </a:rPr>
-              <a:t>];</a:t>
+              <a:t> </a:t>
+            </a:r>
+            <a:r>
+              <a:rPr lang="en-US" dirty="0" smtClean="0">
+                <a:latin typeface="Consolas"/>
+                <a:cs typeface="Consolas"/>
+              </a:rPr>
+              <a:t> </a:t>
+            </a:r>
+            <a:r>
+              <a:rPr lang="en-US" b="1" dirty="0" smtClean="0">
+                <a:latin typeface="Consolas"/>
+                <a:cs typeface="Consolas"/>
+              </a:rPr>
+              <a:t>new</a:t>
+            </a:r>
+            <a:r>
+              <a:rPr lang="en-US" dirty="0" smtClean="0">
+                <a:latin typeface="Consolas"/>
+                <a:cs typeface="Consolas"/>
+              </a:rPr>
+              <a:t> </a:t>
+            </a:r>
+            <a:r>
+              <a:rPr lang="en-US" dirty="0" err="1">
+                <a:latin typeface="Consolas"/>
+                <a:cs typeface="Consolas"/>
+              </a:rPr>
+              <a:t>MyClass</a:t>
+            </a:r>
+            <a:r>
+              <a:rPr lang="en-US" dirty="0">
+                <a:latin typeface="Consolas"/>
+                <a:cs typeface="Consolas"/>
+              </a:rPr>
+              <a:t>()</a:t>
+            </a:r>
+            <a:r>
+              <a:rPr lang="en-US" dirty="0" smtClean="0">
+                <a:latin typeface="Consolas"/>
+                <a:cs typeface="Consolas"/>
+              </a:rPr>
+              <a:t>;</a:t>
             </a:r>
           </a:p>
           <a:p>
@@ -8861,12 +9151,8 @@
                 <a:latin typeface="Consolas"/>
                 <a:cs typeface="Consolas"/>
               </a:rPr>
-              <a:t>   }</a:t>
-            </a:r>
-            <a:endParaRPr lang="en-US" dirty="0">
-              <a:latin typeface="Consolas"/>
-              <a:cs typeface="Consolas"/>
-            </a:endParaRPr>
+              <a:t>    p | ∗pointer; </a:t>
+            </a:r>
           </a:p>
           <a:p>
             <a:pPr marL="0" indent="0">
@@ -8877,335 +9163,19 @@
                 <a:latin typeface="Consolas"/>
                 <a:cs typeface="Consolas"/>
               </a:rPr>
-              <a:t>   p</a:t>
-            </a:r>
-            <a:r>
-              <a:rPr lang="en-US" dirty="0">
-                <a:latin typeface="Consolas"/>
-                <a:cs typeface="Consolas"/>
-              </a:rPr>
-              <a:t>(</a:t>
-            </a:r>
-            <a:r>
-              <a:rPr lang="en-US" dirty="0" err="1">
-                <a:latin typeface="Consolas"/>
-                <a:cs typeface="Consolas"/>
-              </a:rPr>
-              <a:t>heapArray</a:t>
-            </a:r>
-            <a:r>
-              <a:rPr lang="en-US" dirty="0">
-                <a:latin typeface="Consolas"/>
-                <a:cs typeface="Consolas"/>
-              </a:rPr>
-              <a:t>, </a:t>
-            </a:r>
-            <a:r>
-              <a:rPr lang="en-US" dirty="0" err="1">
-                <a:latin typeface="Consolas"/>
-                <a:cs typeface="Consolas"/>
-              </a:rPr>
-              <a:t>heapArraySize</a:t>
-            </a:r>
-            <a:r>
-              <a:rPr lang="en-US" dirty="0">
-                <a:latin typeface="Consolas"/>
-                <a:cs typeface="Consolas"/>
-              </a:rPr>
-              <a:t>); </a:t>
-            </a:r>
-            <a:endParaRPr lang="en-US" dirty="0" smtClean="0">
-              <a:latin typeface="Consolas"/>
-              <a:cs typeface="Consolas"/>
-            </a:endParaRPr>
+              <a:t>    }</a:t>
+            </a:r>
           </a:p>
           <a:p>
             <a:pPr marL="0" indent="0">
               <a:buNone/>
             </a:pPr>
             <a:r>
-              <a:rPr lang="en-US" dirty="0">
-                <a:latin typeface="Consolas"/>
-                <a:cs typeface="Consolas"/>
-              </a:rPr>
-              <a:t> </a:t>
-            </a:r>
-            <a:r>
               <a:rPr lang="en-US" dirty="0" smtClean="0">
                 <a:latin typeface="Consolas"/>
                 <a:cs typeface="Consolas"/>
               </a:rPr>
-              <a:t>  </a:t>
-            </a:r>
-            <a:r>
-              <a:rPr lang="en-US" b="1" dirty="0" err="1" smtClean="0">
-                <a:latin typeface="Consolas"/>
-                <a:cs typeface="Consolas"/>
-              </a:rPr>
-              <a:t>bool</a:t>
-            </a:r>
-            <a:r>
-              <a:rPr lang="en-US" dirty="0" smtClean="0">
-                <a:latin typeface="Consolas"/>
-                <a:cs typeface="Consolas"/>
-              </a:rPr>
-              <a:t> </a:t>
-            </a:r>
-            <a:r>
-              <a:rPr lang="en-US" dirty="0" err="1">
-                <a:latin typeface="Consolas"/>
-                <a:cs typeface="Consolas"/>
-              </a:rPr>
-              <a:t>isNull</a:t>
-            </a:r>
-            <a:r>
-              <a:rPr lang="en-US" dirty="0">
-                <a:latin typeface="Consolas"/>
-                <a:cs typeface="Consolas"/>
-              </a:rPr>
-              <a:t> = !pointer;</a:t>
-            </a:r>
-          </a:p>
-          <a:p>
-            <a:pPr marL="0" indent="0">
-              <a:buNone/>
-            </a:pPr>
-            <a:r>
-              <a:rPr lang="en-US" dirty="0" smtClean="0">
-                <a:latin typeface="Consolas"/>
-                <a:cs typeface="Consolas"/>
-              </a:rPr>
-              <a:t>   p </a:t>
-            </a:r>
-            <a:r>
-              <a:rPr lang="en-US" dirty="0">
-                <a:latin typeface="Consolas"/>
-                <a:cs typeface="Consolas"/>
-              </a:rPr>
-              <a:t>| </a:t>
-            </a:r>
-            <a:r>
-              <a:rPr lang="en-US" dirty="0" err="1">
-                <a:latin typeface="Consolas"/>
-                <a:cs typeface="Consolas"/>
-              </a:rPr>
-              <a:t>isNull</a:t>
-            </a:r>
-            <a:r>
-              <a:rPr lang="en-US" dirty="0">
-                <a:latin typeface="Consolas"/>
-                <a:cs typeface="Consolas"/>
-              </a:rPr>
-              <a:t>;</a:t>
-            </a:r>
-          </a:p>
-          <a:p>
-            <a:pPr marL="0" indent="0">
-              <a:buNone/>
-            </a:pPr>
-            <a:r>
-              <a:rPr lang="en-US" dirty="0" smtClean="0">
-                <a:latin typeface="Consolas"/>
-                <a:cs typeface="Consolas"/>
-              </a:rPr>
-              <a:t>   </a:t>
-            </a:r>
-            <a:r>
-              <a:rPr lang="en-US" b="1" dirty="0" smtClean="0">
-                <a:latin typeface="Consolas"/>
-                <a:cs typeface="Consolas"/>
-              </a:rPr>
-              <a:t>if</a:t>
-            </a:r>
-            <a:r>
-              <a:rPr lang="en-US" dirty="0" smtClean="0">
-                <a:latin typeface="Consolas"/>
-                <a:cs typeface="Consolas"/>
-              </a:rPr>
-              <a:t> </a:t>
-            </a:r>
-            <a:r>
-              <a:rPr lang="en-US" dirty="0">
-                <a:latin typeface="Consolas"/>
-                <a:cs typeface="Consolas"/>
-              </a:rPr>
-              <a:t>(!</a:t>
-            </a:r>
-            <a:r>
-              <a:rPr lang="en-US" dirty="0" err="1">
-                <a:latin typeface="Consolas"/>
-                <a:cs typeface="Consolas"/>
-              </a:rPr>
-              <a:t>isNull</a:t>
-            </a:r>
-            <a:r>
-              <a:rPr lang="en-US" dirty="0">
-                <a:latin typeface="Consolas"/>
-                <a:cs typeface="Consolas"/>
-              </a:rPr>
-              <a:t>) {</a:t>
-            </a:r>
-          </a:p>
-          <a:p>
-            <a:pPr marL="0" indent="0">
-              <a:buNone/>
-            </a:pPr>
-            <a:r>
-              <a:rPr lang="en-US" dirty="0" smtClean="0">
-                <a:latin typeface="Consolas"/>
-                <a:cs typeface="Consolas"/>
-              </a:rPr>
-              <a:t>      </a:t>
-            </a:r>
-            <a:r>
-              <a:rPr lang="en-US" sz="2200" b="1" dirty="0" smtClean="0">
-                <a:latin typeface="Consolas"/>
-                <a:cs typeface="Consolas"/>
-              </a:rPr>
-              <a:t>if</a:t>
-            </a:r>
-            <a:r>
-              <a:rPr lang="en-US" sz="2200" dirty="0" smtClean="0">
-                <a:latin typeface="Consolas"/>
-                <a:cs typeface="Consolas"/>
-              </a:rPr>
-              <a:t> </a:t>
-            </a:r>
-            <a:r>
-              <a:rPr lang="en-US" sz="2200" dirty="0">
-                <a:latin typeface="Consolas"/>
-                <a:cs typeface="Consolas"/>
-              </a:rPr>
-              <a:t>(</a:t>
-            </a:r>
-            <a:r>
-              <a:rPr lang="en-US" sz="2200" dirty="0" err="1">
-                <a:latin typeface="Consolas"/>
-                <a:cs typeface="Consolas"/>
-              </a:rPr>
-              <a:t>p.isUnpacking</a:t>
-            </a:r>
-            <a:r>
-              <a:rPr lang="en-US" sz="2200" dirty="0">
-                <a:latin typeface="Consolas"/>
-                <a:cs typeface="Consolas"/>
-              </a:rPr>
-              <a:t>()) pointer </a:t>
-            </a:r>
-            <a:r>
-              <a:rPr lang="en-US" sz="2200" dirty="0" smtClean="0">
-                <a:latin typeface="Consolas"/>
-                <a:cs typeface="Consolas"/>
-              </a:rPr>
-              <a:t>=</a:t>
-            </a:r>
-          </a:p>
-          <a:p>
-            <a:pPr marL="0" indent="0">
-              <a:buNone/>
-            </a:pPr>
-            <a:r>
-              <a:rPr lang="en-US" dirty="0">
-                <a:latin typeface="Consolas"/>
-                <a:cs typeface="Consolas"/>
-              </a:rPr>
-              <a:t> </a:t>
-            </a:r>
-            <a:r>
-              <a:rPr lang="en-US" dirty="0" smtClean="0">
-                <a:latin typeface="Consolas"/>
-                <a:cs typeface="Consolas"/>
-              </a:rPr>
-              <a:t>           </a:t>
-            </a:r>
-            <a:r>
-              <a:rPr lang="en-US" b="1" dirty="0" smtClean="0">
-                <a:latin typeface="Consolas"/>
-                <a:cs typeface="Consolas"/>
-              </a:rPr>
-              <a:t>new</a:t>
-            </a:r>
-            <a:r>
-              <a:rPr lang="en-US" dirty="0" smtClean="0">
-                <a:latin typeface="Consolas"/>
-                <a:cs typeface="Consolas"/>
-              </a:rPr>
-              <a:t> </a:t>
-            </a:r>
-            <a:r>
-              <a:rPr lang="en-US" dirty="0" err="1">
-                <a:latin typeface="Consolas"/>
-                <a:cs typeface="Consolas"/>
-              </a:rPr>
-              <a:t>MyClass</a:t>
-            </a:r>
-            <a:r>
-              <a:rPr lang="en-US" dirty="0">
-                <a:latin typeface="Consolas"/>
-                <a:cs typeface="Consolas"/>
-              </a:rPr>
-              <a:t>();</a:t>
-            </a:r>
-          </a:p>
-          <a:p>
-            <a:pPr marL="0" indent="0">
-              <a:buNone/>
-            </a:pPr>
-            <a:r>
-              <a:rPr lang="en-US" dirty="0">
-                <a:latin typeface="Consolas"/>
-                <a:cs typeface="Consolas"/>
-              </a:rPr>
-              <a:t> </a:t>
-            </a:r>
-            <a:r>
-              <a:rPr lang="en-US" dirty="0" smtClean="0">
-                <a:latin typeface="Consolas"/>
-                <a:cs typeface="Consolas"/>
-              </a:rPr>
-              <a:t>     p </a:t>
-            </a:r>
-            <a:r>
-              <a:rPr lang="en-US" dirty="0">
-                <a:latin typeface="Consolas"/>
-                <a:cs typeface="Consolas"/>
-              </a:rPr>
-              <a:t>| ∗pointer; </a:t>
-            </a:r>
-            <a:endParaRPr lang="en-US" dirty="0" smtClean="0">
-              <a:latin typeface="Consolas"/>
-              <a:cs typeface="Consolas"/>
-            </a:endParaRPr>
-          </a:p>
-          <a:p>
-            <a:pPr marL="0" indent="0">
-              <a:buNone/>
-            </a:pPr>
-            <a:r>
-              <a:rPr lang="en-US" dirty="0">
-                <a:latin typeface="Consolas"/>
-                <a:cs typeface="Consolas"/>
-              </a:rPr>
-              <a:t> </a:t>
-            </a:r>
-            <a:r>
-              <a:rPr lang="en-US" dirty="0" smtClean="0">
-                <a:latin typeface="Consolas"/>
-                <a:cs typeface="Consolas"/>
-              </a:rPr>
-              <a:t>     }</a:t>
-            </a:r>
-          </a:p>
-          <a:p>
-            <a:pPr marL="0" indent="0">
-              <a:buNone/>
-            </a:pPr>
-            <a:r>
-              <a:rPr lang="en-US" dirty="0" smtClean="0">
-                <a:latin typeface="Consolas"/>
-                <a:cs typeface="Consolas"/>
-              </a:rPr>
-              <a:t>   } </a:t>
+              <a:t>  } </a:t>
             </a:r>
           </a:p>
           <a:p>
@@ -10033,18 +10003,32 @@
               <a:t>(</a:t>
             </a:r>
             <a:r>
+              <a:rPr lang="en-US" dirty="0" err="1" smtClean="0">
+                <a:latin typeface="Consolas"/>
+                <a:cs typeface="Consolas"/>
+              </a:rPr>
+              <a:t>CkIndex</a:t>
+            </a:r>
+            <a:r>
               <a:rPr lang="en-US" dirty="0" err="1">
                 <a:latin typeface="Consolas"/>
                 <a:cs typeface="Consolas"/>
               </a:rPr>
-              <a:t>CkIndex</a:t>
+              <a:t>_</a:t>
+            </a:r>
+            <a:r>
+              <a:rPr lang="en-US" dirty="0" err="1" smtClean="0">
+                <a:latin typeface="Consolas"/>
+                <a:cs typeface="Consolas"/>
+              </a:rPr>
+              <a:t>Hello</a:t>
             </a:r>
             <a:r>
               <a:rPr lang="en-US" dirty="0">
                 <a:latin typeface="Consolas"/>
                 <a:cs typeface="Consolas"/>
               </a:rPr>
-              <a:t> Hello::</a:t>
+              <a:t>::</a:t>
             </a:r>
             <a:r>
               <a:rPr lang="en-US" dirty="0" err="1">
@@ -10089,11 +10073,11 @@
               <a:t>CkStartCheckpoint</a:t>
             </a:r>
             <a:r>
-              <a:rPr lang="en-US" dirty="0">
-                <a:latin typeface="Consolas"/>
-                <a:cs typeface="Consolas"/>
-              </a:rPr>
-              <a:t>(‘‘log’’,</a:t>
+              <a:rPr lang="en-US" dirty="0" smtClean="0">
+                <a:latin typeface="Consolas"/>
+                <a:cs typeface="Consolas"/>
+              </a:rPr>
+              <a:t>(“log”,</a:t>
             </a:r>
             <a:r>
               <a:rPr lang="en-US" dirty="0" err="1">

</xml_diff>